<commit_message>
repo clean-up, jochen's slides
</commit_message>
<xml_diff>
--- a/LaTeX/Presentation/Presentation.pptx
+++ b/LaTeX/Presentation/Presentation.pptx
@@ -146,7 +146,7 @@
             <a:lum bright="10000"/>
             <a:extLst>
               <a:ext uri="{28A0092B-C50C-407E-A947-70E740481C1C}">
-                <a14:useLocalDpi xmlns:a14="http://schemas.microsoft.com/office/drawing/2010/main" val="0"/>
+                <a14:useLocalDpi xmlns="" xmlns:a14="http://schemas.microsoft.com/office/drawing/2010/main" val="0"/>
               </a:ext>
             </a:extLst>
           </a:blip>
@@ -168,14 +168,14 @@
           </a:ln>
           <a:extLst>
             <a:ext uri="{909E8E84-426E-40dd-AFC4-6F175D3DCCD1}">
-              <a14:hiddenFill xmlns:a14="http://schemas.microsoft.com/office/drawing/2010/main">
+              <a14:hiddenFill xmlns="" xmlns:a14="http://schemas.microsoft.com/office/drawing/2010/main">
                 <a:solidFill>
                   <a:srgbClr val="FFFFFF"/>
                 </a:solidFill>
               </a14:hiddenFill>
             </a:ext>
             <a:ext uri="{91240B29-F687-4f45-9708-019B960494DF}">
-              <a14:hiddenLine xmlns:a14="http://schemas.microsoft.com/office/drawing/2010/main" w="9525">
+              <a14:hiddenLine xmlns="" xmlns:a14="http://schemas.microsoft.com/office/drawing/2010/main" w="9525">
                 <a:solidFill>
                   <a:srgbClr val="000000"/>
                 </a:solidFill>
@@ -213,7 +213,7 @@
           </a:ln>
           <a:extLst>
             <a:ext uri="{91240B29-F687-4f45-9708-019B960494DF}">
-              <a14:hiddenLine xmlns:a14="http://schemas.microsoft.com/office/drawing/2010/main" w="9525">
+              <a14:hiddenLine xmlns="" xmlns:a14="http://schemas.microsoft.com/office/drawing/2010/main" w="9525">
                 <a:solidFill>
                   <a:srgbClr val="000000"/>
                 </a:solidFill>
@@ -244,7 +244,7 @@
           <a:blip r:embed="rId3" cstate="print">
             <a:extLst>
               <a:ext uri="{28A0092B-C50C-407E-A947-70E740481C1C}">
-                <a14:useLocalDpi xmlns:a14="http://schemas.microsoft.com/office/drawing/2010/main" val="0"/>
+                <a14:useLocalDpi xmlns="" xmlns:a14="http://schemas.microsoft.com/office/drawing/2010/main" val="0"/>
               </a:ext>
             </a:extLst>
           </a:blip>
@@ -267,14 +267,14 @@
           </a:ln>
           <a:extLst>
             <a:ext uri="{909E8E84-426E-40dd-AFC4-6F175D3DCCD1}">
-              <a14:hiddenFill xmlns:a14="http://schemas.microsoft.com/office/drawing/2010/main">
+              <a14:hiddenFill xmlns="" xmlns:a14="http://schemas.microsoft.com/office/drawing/2010/main">
                 <a:solidFill>
                   <a:srgbClr val="FFFFFF"/>
                 </a:solidFill>
               </a14:hiddenFill>
             </a:ext>
             <a:ext uri="{91240B29-F687-4f45-9708-019B960494DF}">
-              <a14:hiddenLine xmlns:a14="http://schemas.microsoft.com/office/drawing/2010/main" w="9525">
+              <a14:hiddenLine xmlns="" xmlns:a14="http://schemas.microsoft.com/office/drawing/2010/main" w="9525">
                 <a:solidFill>
                   <a:srgbClr val="000000"/>
                 </a:solidFill>
@@ -378,14 +378,14 @@
           </a:prstGeom>
           <a:extLst>
             <a:ext uri="{909E8E84-426E-40dd-AFC4-6F175D3DCCD1}">
-              <a14:hiddenFill xmlns:a14="http://schemas.microsoft.com/office/drawing/2010/main">
+              <a14:hiddenFill xmlns="" xmlns:a14="http://schemas.microsoft.com/office/drawing/2010/main">
                 <a:solidFill>
                   <a:schemeClr val="accent1"/>
                 </a:solidFill>
               </a14:hiddenFill>
             </a:ext>
             <a:ext uri="{91240B29-F687-4f45-9708-019B960494DF}">
-              <a14:hiddenLine xmlns:a14="http://schemas.microsoft.com/office/drawing/2010/main" w="9525">
+              <a14:hiddenLine xmlns="" xmlns:a14="http://schemas.microsoft.com/office/drawing/2010/main" w="9525">
                 <a:solidFill>
                   <a:schemeClr val="tx1"/>
                 </a:solidFill>
@@ -395,7 +395,7 @@
               </a14:hiddenLine>
             </a:ext>
             <a:ext uri="{AF507438-7753-43e0-B8FC-AC1667EBCBE1}">
-              <a14:hiddenEffects xmlns:a14="http://schemas.microsoft.com/office/drawing/2010/main">
+              <a14:hiddenEffects xmlns="" xmlns:a14="http://schemas.microsoft.com/office/drawing/2010/main">
                 <a:effectLst>
                   <a:outerShdw dist="35921" dir="2700000" algn="ctr" rotWithShape="0">
                     <a:schemeClr val="bg2"/>
@@ -426,7 +426,7 @@
             <a:fld id="{705B44B1-6112-407E-9C4B-9D7CA3639A2D}" type="datetimeFigureOut">
               <a:rPr lang="de-DE" smtClean="0"/>
               <a:pPr/>
-              <a:t>20.05.13</a:t>
+              <a:t>20.05.2013</a:t>
             </a:fld>
             <a:endParaRPr lang="de-DE"/>
           </a:p>
@@ -444,7 +444,7 @@
           <a:blip r:embed="rId4" cstate="print">
             <a:extLst>
               <a:ext uri="{28A0092B-C50C-407E-A947-70E740481C1C}">
-                <a14:useLocalDpi xmlns:a14="http://schemas.microsoft.com/office/drawing/2010/main" val="0"/>
+                <a14:useLocalDpi xmlns="" xmlns:a14="http://schemas.microsoft.com/office/drawing/2010/main" val="0"/>
               </a:ext>
             </a:extLst>
           </a:blip>
@@ -464,7 +464,7 @@
           <a:noFill/>
           <a:extLst>
             <a:ext uri="{909E8E84-426E-40dd-AFC4-6F175D3DCCD1}">
-              <a14:hiddenFill xmlns:a14="http://schemas.microsoft.com/office/drawing/2010/main">
+              <a14:hiddenFill xmlns="" xmlns:a14="http://schemas.microsoft.com/office/drawing/2010/main">
                 <a:solidFill>
                   <a:srgbClr val="FFFFFF"/>
                 </a:solidFill>
@@ -476,7 +476,7 @@
     </p:spTree>
     <p:extLst>
       <p:ext uri="{BB962C8B-B14F-4D97-AF65-F5344CB8AC3E}">
-        <p14:creationId xmlns:p14="http://schemas.microsoft.com/office/powerpoint/2010/main" val="473742791"/>
+        <p14:creationId xmlns="" xmlns:p14="http://schemas.microsoft.com/office/powerpoint/2010/main" val="473742791"/>
       </p:ext>
     </p:extLst>
   </p:cSld>
@@ -604,7 +604,7 @@
             <a:fld id="{705B44B1-6112-407E-9C4B-9D7CA3639A2D}" type="datetimeFigureOut">
               <a:rPr lang="de-DE" smtClean="0"/>
               <a:pPr/>
-              <a:t>20.05.13</a:t>
+              <a:t>20.05.2013</a:t>
             </a:fld>
             <a:endParaRPr lang="de-DE"/>
           </a:p>
@@ -773,7 +773,7 @@
     </p:spTree>
     <p:extLst>
       <p:ext uri="{BB962C8B-B14F-4D97-AF65-F5344CB8AC3E}">
-        <p14:creationId xmlns:p14="http://schemas.microsoft.com/office/powerpoint/2010/main" val="1687810716"/>
+        <p14:creationId xmlns="" xmlns:p14="http://schemas.microsoft.com/office/powerpoint/2010/main" val="1687810716"/>
       </p:ext>
     </p:extLst>
   </p:cSld>
@@ -890,7 +890,7 @@
     </p:spTree>
     <p:extLst>
       <p:ext uri="{BB962C8B-B14F-4D97-AF65-F5344CB8AC3E}">
-        <p14:creationId xmlns:p14="http://schemas.microsoft.com/office/powerpoint/2010/main" val="4140983553"/>
+        <p14:creationId xmlns="" xmlns:p14="http://schemas.microsoft.com/office/powerpoint/2010/main" val="4140983553"/>
       </p:ext>
     </p:extLst>
   </p:cSld>
@@ -2565,7 +2565,7 @@
           <a:blip r:embed="rId12" cstate="print">
             <a:extLst>
               <a:ext uri="{28A0092B-C50C-407E-A947-70E740481C1C}">
-                <a14:useLocalDpi xmlns:a14="http://schemas.microsoft.com/office/drawing/2010/main" val="0"/>
+                <a14:useLocalDpi xmlns="" xmlns:a14="http://schemas.microsoft.com/office/drawing/2010/main" val="0"/>
               </a:ext>
             </a:extLst>
           </a:blip>
@@ -2588,14 +2588,14 @@
           </a:ln>
           <a:extLst>
             <a:ext uri="{909E8E84-426E-40dd-AFC4-6F175D3DCCD1}">
-              <a14:hiddenFill xmlns:a14="http://schemas.microsoft.com/office/drawing/2010/main">
+              <a14:hiddenFill xmlns="" xmlns:a14="http://schemas.microsoft.com/office/drawing/2010/main">
                 <a:solidFill>
                   <a:srgbClr val="FFFFFF"/>
                 </a:solidFill>
               </a14:hiddenFill>
             </a:ext>
             <a:ext uri="{91240B29-F687-4f45-9708-019B960494DF}">
-              <a14:hiddenLine xmlns:a14="http://schemas.microsoft.com/office/drawing/2010/main" w="9525">
+              <a14:hiddenLine xmlns="" xmlns:a14="http://schemas.microsoft.com/office/drawing/2010/main" w="9525">
                 <a:solidFill>
                   <a:srgbClr val="000000"/>
                 </a:solidFill>
@@ -2619,7 +2619,7 @@
           <a:blip r:embed="rId13" cstate="print">
             <a:extLst>
               <a:ext uri="{28A0092B-C50C-407E-A947-70E740481C1C}">
-                <a14:useLocalDpi xmlns:a14="http://schemas.microsoft.com/office/drawing/2010/main" val="0"/>
+                <a14:useLocalDpi xmlns="" xmlns:a14="http://schemas.microsoft.com/office/drawing/2010/main" val="0"/>
               </a:ext>
             </a:extLst>
           </a:blip>
@@ -2642,14 +2642,14 @@
           </a:ln>
           <a:extLst>
             <a:ext uri="{909E8E84-426E-40dd-AFC4-6F175D3DCCD1}">
-              <a14:hiddenFill xmlns:a14="http://schemas.microsoft.com/office/drawing/2010/main">
+              <a14:hiddenFill xmlns="" xmlns:a14="http://schemas.microsoft.com/office/drawing/2010/main">
                 <a:solidFill>
                   <a:srgbClr val="FFFFFF"/>
                 </a:solidFill>
               </a14:hiddenFill>
             </a:ext>
             <a:ext uri="{91240B29-F687-4f45-9708-019B960494DF}">
-              <a14:hiddenLine xmlns:a14="http://schemas.microsoft.com/office/drawing/2010/main" w="9525">
+              <a14:hiddenLine xmlns="" xmlns:a14="http://schemas.microsoft.com/office/drawing/2010/main" w="9525">
                 <a:solidFill>
                   <a:srgbClr val="000000"/>
                 </a:solidFill>
@@ -2687,7 +2687,7 @@
           </a:ln>
           <a:extLst>
             <a:ext uri="{91240B29-F687-4f45-9708-019B960494DF}">
-              <a14:hiddenLine xmlns:a14="http://schemas.microsoft.com/office/drawing/2010/main" w="9525">
+              <a14:hiddenLine xmlns="" xmlns:a14="http://schemas.microsoft.com/office/drawing/2010/main" w="9525">
                 <a:solidFill>
                   <a:srgbClr val="000000"/>
                 </a:solidFill>
@@ -2730,14 +2730,14 @@
           </a:ln>
           <a:extLst>
             <a:ext uri="{909E8E84-426E-40dd-AFC4-6F175D3DCCD1}">
-              <a14:hiddenFill xmlns:a14="http://schemas.microsoft.com/office/drawing/2010/main">
+              <a14:hiddenFill xmlns="" xmlns:a14="http://schemas.microsoft.com/office/drawing/2010/main">
                 <a:solidFill>
                   <a:srgbClr val="FFFFFF"/>
                 </a:solidFill>
               </a14:hiddenFill>
             </a:ext>
             <a:ext uri="{91240B29-F687-4f45-9708-019B960494DF}">
-              <a14:hiddenLine xmlns:a14="http://schemas.microsoft.com/office/drawing/2010/main" w="9525">
+              <a14:hiddenLine xmlns="" xmlns:a14="http://schemas.microsoft.com/office/drawing/2010/main" w="9525">
                 <a:solidFill>
                   <a:srgbClr val="000000"/>
                 </a:solidFill>
@@ -2869,14 +2869,14 @@
           </a:ln>
           <a:extLst>
             <a:ext uri="{909E8E84-426E-40dd-AFC4-6F175D3DCCD1}">
-              <a14:hiddenFill xmlns:a14="http://schemas.microsoft.com/office/drawing/2010/main">
+              <a14:hiddenFill xmlns="" xmlns:a14="http://schemas.microsoft.com/office/drawing/2010/main">
                 <a:solidFill>
                   <a:srgbClr val="FFFFFF"/>
                 </a:solidFill>
               </a14:hiddenFill>
             </a:ext>
             <a:ext uri="{91240B29-F687-4f45-9708-019B960494DF}">
-              <a14:hiddenLine xmlns:a14="http://schemas.microsoft.com/office/drawing/2010/main" w="9525">
+              <a14:hiddenLine xmlns="" xmlns:a14="http://schemas.microsoft.com/office/drawing/2010/main" w="9525">
                 <a:solidFill>
                   <a:srgbClr val="000000"/>
                 </a:solidFill>
@@ -2984,7 +2984,7 @@
           <a:blip r:embed="rId14" cstate="print">
             <a:extLst>
               <a:ext uri="{28A0092B-C50C-407E-A947-70E740481C1C}">
-                <a14:useLocalDpi xmlns:a14="http://schemas.microsoft.com/office/drawing/2010/main" val="0"/>
+                <a14:useLocalDpi xmlns="" xmlns:a14="http://schemas.microsoft.com/office/drawing/2010/main" val="0"/>
               </a:ext>
             </a:extLst>
           </a:blip>
@@ -3007,14 +3007,14 @@
           </a:ln>
           <a:extLst>
             <a:ext uri="{909E8E84-426E-40dd-AFC4-6F175D3DCCD1}">
-              <a14:hiddenFill xmlns:a14="http://schemas.microsoft.com/office/drawing/2010/main">
+              <a14:hiddenFill xmlns="" xmlns:a14="http://schemas.microsoft.com/office/drawing/2010/main">
                 <a:solidFill>
                   <a:srgbClr val="FFFFFF"/>
                 </a:solidFill>
               </a14:hiddenFill>
             </a:ext>
             <a:ext uri="{91240B29-F687-4f45-9708-019B960494DF}">
-              <a14:hiddenLine xmlns:a14="http://schemas.microsoft.com/office/drawing/2010/main" w="9525">
+              <a14:hiddenLine xmlns="" xmlns:a14="http://schemas.microsoft.com/office/drawing/2010/main" w="9525">
                 <a:solidFill>
                   <a:srgbClr val="000000"/>
                 </a:solidFill>
@@ -3713,7 +3713,7 @@
     </p:spTree>
     <p:extLst>
       <p:ext uri="{BB962C8B-B14F-4D97-AF65-F5344CB8AC3E}">
-        <p14:creationId xmlns:p14="http://schemas.microsoft.com/office/powerpoint/2010/main" val="3892161252"/>
+        <p14:creationId xmlns="" xmlns:p14="http://schemas.microsoft.com/office/powerpoint/2010/main" val="3892161252"/>
       </p:ext>
     </p:extLst>
   </p:cSld>
@@ -3789,7 +3789,7 @@
     </p:spTree>
     <p:extLst>
       <p:ext uri="{BB962C8B-B14F-4D97-AF65-F5344CB8AC3E}">
-        <p14:creationId xmlns:p14="http://schemas.microsoft.com/office/powerpoint/2010/main" val="2589692261"/>
+        <p14:creationId xmlns="" xmlns:p14="http://schemas.microsoft.com/office/powerpoint/2010/main" val="2589692261"/>
       </p:ext>
     </p:extLst>
   </p:cSld>
@@ -3861,7 +3861,7 @@
     </p:spTree>
     <p:extLst>
       <p:ext uri="{BB962C8B-B14F-4D97-AF65-F5344CB8AC3E}">
-        <p14:creationId xmlns:p14="http://schemas.microsoft.com/office/powerpoint/2010/main" val="3180181714"/>
+        <p14:creationId xmlns="" xmlns:p14="http://schemas.microsoft.com/office/powerpoint/2010/main" val="3180181714"/>
       </p:ext>
     </p:extLst>
   </p:cSld>
@@ -3984,7 +3984,7 @@
     </p:spTree>
     <p:extLst>
       <p:ext uri="{BB962C8B-B14F-4D97-AF65-F5344CB8AC3E}">
-        <p14:creationId xmlns:p14="http://schemas.microsoft.com/office/powerpoint/2010/main" val="2170195699"/>
+        <p14:creationId xmlns="" xmlns:p14="http://schemas.microsoft.com/office/powerpoint/2010/main" val="2170195699"/>
       </p:ext>
     </p:extLst>
   </p:cSld>
@@ -4053,6 +4053,10 @@
           <a:bodyPr/>
           <a:lstStyle/>
           <a:p>
+            <a:r>
+              <a:rPr lang="de-DE" smtClean="0"/>
+              <a:t>Matze!</a:t>
+            </a:r>
             <a:endParaRPr lang="de-DE"/>
           </a:p>
         </p:txBody>
@@ -4060,7 +4064,7 @@
     </p:spTree>
     <p:extLst>
       <p:ext uri="{BB962C8B-B14F-4D97-AF65-F5344CB8AC3E}">
-        <p14:creationId xmlns:p14="http://schemas.microsoft.com/office/powerpoint/2010/main" val="634696858"/>
+        <p14:creationId xmlns="" xmlns:p14="http://schemas.microsoft.com/office/powerpoint/2010/main" val="634696858"/>
       </p:ext>
     </p:extLst>
   </p:cSld>
@@ -4136,7 +4140,7 @@
     </p:spTree>
     <p:extLst>
       <p:ext uri="{BB962C8B-B14F-4D97-AF65-F5344CB8AC3E}">
-        <p14:creationId xmlns:p14="http://schemas.microsoft.com/office/powerpoint/2010/main" val="3962257012"/>
+        <p14:creationId xmlns="" xmlns:p14="http://schemas.microsoft.com/office/powerpoint/2010/main" val="3962257012"/>
       </p:ext>
     </p:extLst>
   </p:cSld>
@@ -4220,7 +4224,7 @@
     </p:spTree>
     <p:extLst>
       <p:ext uri="{BB962C8B-B14F-4D97-AF65-F5344CB8AC3E}">
-        <p14:creationId xmlns:p14="http://schemas.microsoft.com/office/powerpoint/2010/main" val="1637646173"/>
+        <p14:creationId xmlns="" xmlns:p14="http://schemas.microsoft.com/office/powerpoint/2010/main" val="1637646173"/>
       </p:ext>
     </p:extLst>
   </p:cSld>
@@ -4296,7 +4300,7 @@
     </p:spTree>
     <p:extLst>
       <p:ext uri="{BB962C8B-B14F-4D97-AF65-F5344CB8AC3E}">
-        <p14:creationId xmlns:p14="http://schemas.microsoft.com/office/powerpoint/2010/main" val="1733460933"/>
+        <p14:creationId xmlns="" xmlns:p14="http://schemas.microsoft.com/office/powerpoint/2010/main" val="1733460933"/>
       </p:ext>
     </p:extLst>
   </p:cSld>
@@ -4376,7 +4380,7 @@
     </p:spTree>
     <p:extLst>
       <p:ext uri="{BB962C8B-B14F-4D97-AF65-F5344CB8AC3E}">
-        <p14:creationId xmlns:p14="http://schemas.microsoft.com/office/powerpoint/2010/main" val="475931585"/>
+        <p14:creationId xmlns="" xmlns:p14="http://schemas.microsoft.com/office/powerpoint/2010/main" val="475931585"/>
       </p:ext>
     </p:extLst>
   </p:cSld>
@@ -4441,10 +4445,10 @@
           </p:nvPr>
         </p:nvPicPr>
         <p:blipFill rotWithShape="1">
-          <a:blip r:embed="rId2">
+          <a:blip r:embed="rId2" cstate="print">
             <a:extLst>
               <a:ext uri="{28A0092B-C50C-407E-A947-70E740481C1C}">
-                <a14:useLocalDpi xmlns:a14="http://schemas.microsoft.com/office/drawing/2010/main" val="0"/>
+                <a14:useLocalDpi xmlns="" xmlns:a14="http://schemas.microsoft.com/office/drawing/2010/main" val="0"/>
               </a:ext>
             </a:extLst>
           </a:blip>
@@ -4461,7 +4465,7 @@
     </p:spTree>
     <p:extLst>
       <p:ext uri="{BB962C8B-B14F-4D97-AF65-F5344CB8AC3E}">
-        <p14:creationId xmlns:p14="http://schemas.microsoft.com/office/powerpoint/2010/main" val="4252503780"/>
+        <p14:creationId xmlns="" xmlns:p14="http://schemas.microsoft.com/office/powerpoint/2010/main" val="4252503780"/>
       </p:ext>
     </p:extLst>
   </p:cSld>

</xml_diff>